<commit_message>
upload midterm presentation ppt
</commit_message>
<xml_diff>
--- a/Docs/20190515_졸업논문 중간발표/0515 논문 중간발표_final.pptx
+++ b/Docs/20190515_졸업논문 중간발표/0515 논문 중간발표_final.pptx
@@ -7080,6 +7080,52 @@
           </a:p>
           <a:p>
             <a:endParaRPr lang="en-US" altLang="ko-KR" dirty="0"/>
+          </a:p>
+        </p:txBody>
+      </p:sp>
+      <p:sp>
+        <p:nvSpPr>
+          <p:cNvPr id="4" name="위쪽/아래쪽 화살표 3"/>
+          <p:cNvSpPr/>
+          <p:nvPr/>
+        </p:nvSpPr>
+        <p:spPr>
+          <a:xfrm>
+            <a:off x="4096512" y="3572256"/>
+            <a:ext cx="182880" cy="353568"/>
+          </a:xfrm>
+          <a:prstGeom prst="upDownArrow">
+            <a:avLst/>
+          </a:prstGeom>
+          <a:solidFill>
+            <a:srgbClr val="F23B48"/>
+          </a:solidFill>
+          <a:ln>
+            <a:noFill/>
+          </a:ln>
+        </p:spPr>
+        <p:style>
+          <a:lnRef idx="2">
+            <a:schemeClr val="accent1">
+              <a:shade val="50000"/>
+            </a:schemeClr>
+          </a:lnRef>
+          <a:fillRef idx="1">
+            <a:schemeClr val="accent1"/>
+          </a:fillRef>
+          <a:effectRef idx="0">
+            <a:schemeClr val="accent1"/>
+          </a:effectRef>
+          <a:fontRef idx="minor">
+            <a:schemeClr val="lt1"/>
+          </a:fontRef>
+        </p:style>
+        <p:txBody>
+          <a:bodyPr rtlCol="0" anchor="ctr"/>
+          <a:lstStyle/>
+          <a:p>
+            <a:pPr algn="ctr"/>
+            <a:endParaRPr lang="ko-KR" altLang="en-US"/>
           </a:p>
         </p:txBody>
       </p:sp>

</xml_diff>